<commit_message>
add trigram models 3
</commit_message>
<xml_diff>
--- a/hasil ANN.pptx
+++ b/hasil ANN.pptx
@@ -12,6 +12,7 @@
     <p:sldId id="261" r:id="rId6"/>
     <p:sldId id="262" r:id="rId7"/>
     <p:sldId id="264" r:id="rId8"/>
+    <p:sldId id="265" r:id="rId9"/>
   </p:sldIdLst>
   <p:sldSz cx="9144000" cy="6858000" type="screen4x3"/>
   <p:notesSz cx="6858000" cy="9144000"/>
@@ -294,7 +295,7 @@
           <a:p>
             <a:fld id="{971B3293-45C0-406E-BF69-948F0ACD2DA7}" type="datetimeFigureOut">
               <a:rPr lang="en-GB" smtClean="0"/>
-              <a:t>10/06/2017</a:t>
+              <a:t>11/06/2017</a:t>
             </a:fld>
             <a:endParaRPr lang="en-GB"/>
           </a:p>
@@ -464,7 +465,7 @@
           <a:p>
             <a:fld id="{971B3293-45C0-406E-BF69-948F0ACD2DA7}" type="datetimeFigureOut">
               <a:rPr lang="en-GB" smtClean="0"/>
-              <a:t>10/06/2017</a:t>
+              <a:t>11/06/2017</a:t>
             </a:fld>
             <a:endParaRPr lang="en-GB"/>
           </a:p>
@@ -644,7 +645,7 @@
           <a:p>
             <a:fld id="{971B3293-45C0-406E-BF69-948F0ACD2DA7}" type="datetimeFigureOut">
               <a:rPr lang="en-GB" smtClean="0"/>
-              <a:t>10/06/2017</a:t>
+              <a:t>11/06/2017</a:t>
             </a:fld>
             <a:endParaRPr lang="en-GB"/>
           </a:p>
@@ -814,7 +815,7 @@
           <a:p>
             <a:fld id="{971B3293-45C0-406E-BF69-948F0ACD2DA7}" type="datetimeFigureOut">
               <a:rPr lang="en-GB" smtClean="0"/>
-              <a:t>10/06/2017</a:t>
+              <a:t>11/06/2017</a:t>
             </a:fld>
             <a:endParaRPr lang="en-GB"/>
           </a:p>
@@ -1060,7 +1061,7 @@
           <a:p>
             <a:fld id="{971B3293-45C0-406E-BF69-948F0ACD2DA7}" type="datetimeFigureOut">
               <a:rPr lang="en-GB" smtClean="0"/>
-              <a:t>10/06/2017</a:t>
+              <a:t>11/06/2017</a:t>
             </a:fld>
             <a:endParaRPr lang="en-GB"/>
           </a:p>
@@ -1348,7 +1349,7 @@
           <a:p>
             <a:fld id="{971B3293-45C0-406E-BF69-948F0ACD2DA7}" type="datetimeFigureOut">
               <a:rPr lang="en-GB" smtClean="0"/>
-              <a:t>10/06/2017</a:t>
+              <a:t>11/06/2017</a:t>
             </a:fld>
             <a:endParaRPr lang="en-GB"/>
           </a:p>
@@ -1770,7 +1771,7 @@
           <a:p>
             <a:fld id="{971B3293-45C0-406E-BF69-948F0ACD2DA7}" type="datetimeFigureOut">
               <a:rPr lang="en-GB" smtClean="0"/>
-              <a:t>10/06/2017</a:t>
+              <a:t>11/06/2017</a:t>
             </a:fld>
             <a:endParaRPr lang="en-GB"/>
           </a:p>
@@ -1888,7 +1889,7 @@
           <a:p>
             <a:fld id="{971B3293-45C0-406E-BF69-948F0ACD2DA7}" type="datetimeFigureOut">
               <a:rPr lang="en-GB" smtClean="0"/>
-              <a:t>10/06/2017</a:t>
+              <a:t>11/06/2017</a:t>
             </a:fld>
             <a:endParaRPr lang="en-GB"/>
           </a:p>
@@ -1983,7 +1984,7 @@
           <a:p>
             <a:fld id="{971B3293-45C0-406E-BF69-948F0ACD2DA7}" type="datetimeFigureOut">
               <a:rPr lang="en-GB" smtClean="0"/>
-              <a:t>10/06/2017</a:t>
+              <a:t>11/06/2017</a:t>
             </a:fld>
             <a:endParaRPr lang="en-GB"/>
           </a:p>
@@ -2260,7 +2261,7 @@
           <a:p>
             <a:fld id="{971B3293-45C0-406E-BF69-948F0ACD2DA7}" type="datetimeFigureOut">
               <a:rPr lang="en-GB" smtClean="0"/>
-              <a:t>10/06/2017</a:t>
+              <a:t>11/06/2017</a:t>
             </a:fld>
             <a:endParaRPr lang="en-GB"/>
           </a:p>
@@ -2513,7 +2514,7 @@
           <a:p>
             <a:fld id="{971B3293-45C0-406E-BF69-948F0ACD2DA7}" type="datetimeFigureOut">
               <a:rPr lang="en-GB" smtClean="0"/>
-              <a:t>10/06/2017</a:t>
+              <a:t>11/06/2017</a:t>
             </a:fld>
             <a:endParaRPr lang="en-GB"/>
           </a:p>
@@ -2726,7 +2727,7 @@
           <a:p>
             <a:fld id="{971B3293-45C0-406E-BF69-948F0ACD2DA7}" type="datetimeFigureOut">
               <a:rPr lang="en-GB" smtClean="0"/>
-              <a:t>10/06/2017</a:t>
+              <a:t>11/06/2017</a:t>
             </a:fld>
             <a:endParaRPr lang="en-GB"/>
           </a:p>
@@ -4589,6 +4590,335 @@
 </p:sld>
 </file>
 
+<file path=ppt/slides/slide8.xml><?xml version="1.0" encoding="utf-8"?>
+<p:sld xmlns:a="http://schemas.openxmlformats.org/drawingml/2006/main" xmlns:r="http://schemas.openxmlformats.org/officeDocument/2006/relationships" xmlns:p="http://schemas.openxmlformats.org/presentationml/2006/main">
+  <p:cSld>
+    <p:spTree>
+      <p:nvGrpSpPr>
+        <p:cNvPr id="1" name=""/>
+        <p:cNvGrpSpPr/>
+        <p:nvPr/>
+      </p:nvGrpSpPr>
+      <p:grpSpPr>
+        <a:xfrm>
+          <a:off x="0" y="0"/>
+          <a:ext cx="0" cy="0"/>
+          <a:chOff x="0" y="0"/>
+          <a:chExt cx="0" cy="0"/>
+        </a:xfrm>
+      </p:grpSpPr>
+      <p:sp>
+        <p:nvSpPr>
+          <p:cNvPr id="5" name="TextBox 4"/>
+          <p:cNvSpPr txBox="1"/>
+          <p:nvPr/>
+        </p:nvSpPr>
+        <p:spPr>
+          <a:xfrm>
+            <a:off x="1336927" y="204466"/>
+            <a:ext cx="6314742" cy="461665"/>
+          </a:xfrm>
+          <a:prstGeom prst="rect">
+            <a:avLst/>
+          </a:prstGeom>
+          <a:noFill/>
+        </p:spPr>
+        <p:txBody>
+          <a:bodyPr wrap="none" rtlCol="0">
+            <a:spAutoFit/>
+          </a:bodyPr>
+          <a:lstStyle/>
+          <a:p>
+            <a:r>
+              <a:rPr lang="en-GB" sz="2400" b="1" dirty="0" smtClean="0"/>
+              <a:t>516 Data </a:t>
+            </a:r>
+            <a:r>
+              <a:rPr lang="en-GB" sz="2400" b="1" dirty="0" err="1" smtClean="0"/>
+              <a:t>Acak</a:t>
+            </a:r>
+            <a:r>
+              <a:rPr lang="en-GB" sz="2400" b="1" dirty="0" smtClean="0"/>
+              <a:t> (</a:t>
+            </a:r>
+            <a:r>
+              <a:rPr lang="en-GB" sz="2400" b="1" dirty="0" err="1" smtClean="0"/>
+              <a:t>distribusi</a:t>
+            </a:r>
+            <a:r>
+              <a:rPr lang="en-GB" sz="2400" b="1" dirty="0" smtClean="0"/>
+              <a:t> 172 data </a:t>
+            </a:r>
+            <a:r>
+              <a:rPr lang="en-GB" sz="2400" b="1" dirty="0" err="1" smtClean="0"/>
+              <a:t>masing</a:t>
+            </a:r>
+            <a:r>
+              <a:rPr lang="en-GB" sz="2400" b="1" dirty="0" smtClean="0"/>
+              <a:t> </a:t>
+            </a:r>
+            <a:r>
+              <a:rPr lang="en-GB" sz="2400" b="1" dirty="0" err="1" smtClean="0"/>
+              <a:t>kelas</a:t>
+            </a:r>
+            <a:r>
+              <a:rPr lang="en-GB" sz="2400" b="1" dirty="0" smtClean="0"/>
+              <a:t>)</a:t>
+            </a:r>
+            <a:endParaRPr lang="en-GB" sz="2400" b="1" dirty="0"/>
+          </a:p>
+        </p:txBody>
+      </p:sp>
+      <p:sp>
+        <p:nvSpPr>
+          <p:cNvPr id="6" name="TextBox 5"/>
+          <p:cNvSpPr txBox="1"/>
+          <p:nvPr/>
+        </p:nvSpPr>
+        <p:spPr>
+          <a:xfrm>
+            <a:off x="3690199" y="683206"/>
+            <a:ext cx="1516954" cy="369332"/>
+          </a:xfrm>
+          <a:prstGeom prst="rect">
+            <a:avLst/>
+          </a:prstGeom>
+          <a:noFill/>
+        </p:spPr>
+        <p:txBody>
+          <a:bodyPr wrap="none" rtlCol="0">
+            <a:spAutoFit/>
+          </a:bodyPr>
+          <a:lstStyle/>
+          <a:p>
+            <a:r>
+              <a:rPr lang="en-GB" dirty="0" smtClean="0"/>
+              <a:t>Tr</a:t>
+            </a:r>
+            <a:r>
+              <a:rPr lang="en-GB" dirty="0" smtClean="0"/>
+              <a:t>igram </a:t>
+            </a:r>
+            <a:r>
+              <a:rPr lang="en-GB" dirty="0" smtClean="0"/>
+              <a:t>(KBBI)</a:t>
+            </a:r>
+            <a:endParaRPr lang="en-GB" dirty="0"/>
+          </a:p>
+        </p:txBody>
+      </p:sp>
+      <p:sp>
+        <p:nvSpPr>
+          <p:cNvPr id="7" name="TextBox 6"/>
+          <p:cNvSpPr txBox="1"/>
+          <p:nvPr/>
+        </p:nvSpPr>
+        <p:spPr>
+          <a:xfrm>
+            <a:off x="6015085" y="1052538"/>
+            <a:ext cx="1473480" cy="369332"/>
+          </a:xfrm>
+          <a:prstGeom prst="rect">
+            <a:avLst/>
+          </a:prstGeom>
+          <a:noFill/>
+        </p:spPr>
+        <p:txBody>
+          <a:bodyPr wrap="none" rtlCol="0">
+            <a:spAutoFit/>
+          </a:bodyPr>
+          <a:lstStyle/>
+          <a:p>
+            <a:r>
+              <a:rPr lang="en-GB" dirty="0" smtClean="0"/>
+              <a:t>Input decimal</a:t>
+            </a:r>
+            <a:endParaRPr lang="en-GB" dirty="0"/>
+          </a:p>
+        </p:txBody>
+      </p:sp>
+      <p:sp>
+        <p:nvSpPr>
+          <p:cNvPr id="9" name="TextBox 8"/>
+          <p:cNvSpPr txBox="1"/>
+          <p:nvPr/>
+        </p:nvSpPr>
+        <p:spPr>
+          <a:xfrm>
+            <a:off x="1754803" y="1052538"/>
+            <a:ext cx="1229824" cy="369332"/>
+          </a:xfrm>
+          <a:prstGeom prst="rect">
+            <a:avLst/>
+          </a:prstGeom>
+          <a:noFill/>
+        </p:spPr>
+        <p:txBody>
+          <a:bodyPr wrap="none" rtlCol="0">
+            <a:spAutoFit/>
+          </a:bodyPr>
+          <a:lstStyle/>
+          <a:p>
+            <a:r>
+              <a:rPr lang="en-GB" dirty="0" smtClean="0"/>
+              <a:t>Input </a:t>
+            </a:r>
+            <a:r>
+              <a:rPr lang="en-GB" dirty="0" err="1" smtClean="0"/>
+              <a:t>biner</a:t>
+            </a:r>
+            <a:endParaRPr lang="en-GB" dirty="0"/>
+          </a:p>
+        </p:txBody>
+      </p:sp>
+      <p:pic>
+        <p:nvPicPr>
+          <p:cNvPr id="1026" name="Picture 2"/>
+          <p:cNvPicPr>
+            <a:picLocks noChangeAspect="1" noChangeArrowheads="1"/>
+          </p:cNvPicPr>
+          <p:nvPr/>
+        </p:nvPicPr>
+        <p:blipFill>
+          <a:blip r:embed="rId2">
+            <a:extLst>
+              <a:ext uri="{28A0092B-C50C-407E-A947-70E740481C1C}">
+                <a14:useLocalDpi xmlns:a14="http://schemas.microsoft.com/office/drawing/2010/main" val="0"/>
+              </a:ext>
+            </a:extLst>
+          </a:blip>
+          <a:srcRect/>
+          <a:stretch>
+            <a:fillRect/>
+          </a:stretch>
+        </p:blipFill>
+        <p:spPr bwMode="auto">
+          <a:xfrm>
+            <a:off x="102961" y="1689541"/>
+            <a:ext cx="4391337" cy="4596221"/>
+          </a:xfrm>
+          <a:prstGeom prst="rect">
+            <a:avLst/>
+          </a:prstGeom>
+          <a:noFill/>
+          <a:ln>
+            <a:noFill/>
+          </a:ln>
+          <a:effectLst/>
+          <a:extLst>
+            <a:ext uri="{909E8E84-426E-40DD-AFC4-6F175D3DCCD1}">
+              <a14:hiddenFill xmlns:a14="http://schemas.microsoft.com/office/drawing/2010/main">
+                <a:solidFill>
+                  <a:schemeClr val="accent1"/>
+                </a:solidFill>
+              </a14:hiddenFill>
+            </a:ext>
+            <a:ext uri="{91240B29-F687-4F45-9708-019B960494DF}">
+              <a14:hiddenLine xmlns:a14="http://schemas.microsoft.com/office/drawing/2010/main" w="9525">
+                <a:solidFill>
+                  <a:schemeClr val="tx1"/>
+                </a:solidFill>
+                <a:miter lim="800000"/>
+                <a:headEnd/>
+                <a:tailEnd/>
+              </a14:hiddenLine>
+            </a:ext>
+            <a:ext uri="{AF507438-7753-43E0-B8FC-AC1667EBCBE1}">
+              <a14:hiddenEffects xmlns:a14="http://schemas.microsoft.com/office/drawing/2010/main">
+                <a:effectLst>
+                  <a:outerShdw dist="35921" dir="2700000" algn="ctr" rotWithShape="0">
+                    <a:schemeClr val="bg2"/>
+                  </a:outerShdw>
+                </a:effectLst>
+              </a14:hiddenEffects>
+            </a:ext>
+          </a:extLst>
+        </p:spPr>
+      </p:pic>
+      <p:pic>
+        <p:nvPicPr>
+          <p:cNvPr id="1027" name="Picture 3"/>
+          <p:cNvPicPr>
+            <a:picLocks noChangeAspect="1" noChangeArrowheads="1"/>
+          </p:cNvPicPr>
+          <p:nvPr/>
+        </p:nvPicPr>
+        <p:blipFill>
+          <a:blip r:embed="rId3">
+            <a:extLst>
+              <a:ext uri="{28A0092B-C50C-407E-A947-70E740481C1C}">
+                <a14:useLocalDpi xmlns:a14="http://schemas.microsoft.com/office/drawing/2010/main" val="0"/>
+              </a:ext>
+            </a:extLst>
+          </a:blip>
+          <a:srcRect/>
+          <a:stretch>
+            <a:fillRect/>
+          </a:stretch>
+        </p:blipFill>
+        <p:spPr bwMode="auto">
+          <a:xfrm>
+            <a:off x="4560363" y="1689540"/>
+            <a:ext cx="4382923" cy="4596221"/>
+          </a:xfrm>
+          <a:prstGeom prst="rect">
+            <a:avLst/>
+          </a:prstGeom>
+          <a:noFill/>
+          <a:ln>
+            <a:noFill/>
+          </a:ln>
+          <a:effectLst/>
+          <a:extLst>
+            <a:ext uri="{909E8E84-426E-40DD-AFC4-6F175D3DCCD1}">
+              <a14:hiddenFill xmlns:a14="http://schemas.microsoft.com/office/drawing/2010/main">
+                <a:solidFill>
+                  <a:schemeClr val="accent1"/>
+                </a:solidFill>
+              </a14:hiddenFill>
+            </a:ext>
+            <a:ext uri="{91240B29-F687-4F45-9708-019B960494DF}">
+              <a14:hiddenLine xmlns:a14="http://schemas.microsoft.com/office/drawing/2010/main" w="9525">
+                <a:solidFill>
+                  <a:schemeClr val="tx1"/>
+                </a:solidFill>
+                <a:miter lim="800000"/>
+                <a:headEnd/>
+                <a:tailEnd/>
+              </a14:hiddenLine>
+            </a:ext>
+            <a:ext uri="{AF507438-7753-43E0-B8FC-AC1667EBCBE1}">
+              <a14:hiddenEffects xmlns:a14="http://schemas.microsoft.com/office/drawing/2010/main">
+                <a:effectLst>
+                  <a:outerShdw dist="35921" dir="2700000" algn="ctr" rotWithShape="0">
+                    <a:schemeClr val="bg2"/>
+                  </a:outerShdw>
+                </a:effectLst>
+              </a14:hiddenEffects>
+            </a:ext>
+          </a:extLst>
+        </p:spPr>
+      </p:pic>
+    </p:spTree>
+    <p:extLst>
+      <p:ext uri="{BB962C8B-B14F-4D97-AF65-F5344CB8AC3E}">
+        <p14:creationId xmlns:p14="http://schemas.microsoft.com/office/powerpoint/2010/main" val="3771710553"/>
+      </p:ext>
+    </p:extLst>
+  </p:cSld>
+  <p:clrMapOvr>
+    <a:masterClrMapping/>
+  </p:clrMapOvr>
+  <p:timing>
+    <p:tnLst>
+      <p:par>
+        <p:cTn id="1" dur="indefinite" restart="never" nodeType="tmRoot"/>
+      </p:par>
+    </p:tnLst>
+  </p:timing>
+</p:sld>
+</file>
+
 <file path=ppt/theme/theme1.xml><?xml version="1.0" encoding="utf-8"?>
 <a:theme xmlns:a="http://schemas.openxmlformats.org/drawingml/2006/main" name="Office Theme">
   <a:themeElements>

</xml_diff>